<commit_message>
Update DG with note implementation, Update class diagrams
</commit_message>
<xml_diff>
--- a/docs/diagrams/ModelComponentClassDiagram.pptx
+++ b/docs/diagrams/ModelComponentClassDiagram.pptx
@@ -208,7 +208,7 @@
           <a:p>
             <a:fld id="{F5CC4B3F-88C1-4FFA-B1B6-F41C21DC6924}" type="datetimeFigureOut">
               <a:rPr lang="en-US" smtClean="0"/>
-              <a:t>10/23/2018</a:t>
+              <a:t>10/30/2018</a:t>
             </a:fld>
             <a:endParaRPr lang="en-US"/>
           </a:p>
@@ -654,7 +654,7 @@
           <a:p>
             <a:fld id="{78C97017-6FC3-485B-9764-EAC9E56C1D49}" type="datetimeFigureOut">
               <a:rPr lang="en-US" smtClean="0"/>
-              <a:t>10/23/2018</a:t>
+              <a:t>10/30/2018</a:t>
             </a:fld>
             <a:endParaRPr lang="en-US"/>
           </a:p>
@@ -822,7 +822,7 @@
           <a:p>
             <a:fld id="{78C97017-6FC3-485B-9764-EAC9E56C1D49}" type="datetimeFigureOut">
               <a:rPr lang="en-US" smtClean="0"/>
-              <a:t>10/23/2018</a:t>
+              <a:t>10/30/2018</a:t>
             </a:fld>
             <a:endParaRPr lang="en-US"/>
           </a:p>
@@ -1000,7 +1000,7 @@
           <a:p>
             <a:fld id="{78C97017-6FC3-485B-9764-EAC9E56C1D49}" type="datetimeFigureOut">
               <a:rPr lang="en-US" smtClean="0"/>
-              <a:t>10/23/2018</a:t>
+              <a:t>10/30/2018</a:t>
             </a:fld>
             <a:endParaRPr lang="en-US"/>
           </a:p>
@@ -1168,7 +1168,7 @@
           <a:p>
             <a:fld id="{78C97017-6FC3-485B-9764-EAC9E56C1D49}" type="datetimeFigureOut">
               <a:rPr lang="en-US" smtClean="0"/>
-              <a:t>10/23/2018</a:t>
+              <a:t>10/30/2018</a:t>
             </a:fld>
             <a:endParaRPr lang="en-US"/>
           </a:p>
@@ -1413,7 +1413,7 @@
           <a:p>
             <a:fld id="{78C97017-6FC3-485B-9764-EAC9E56C1D49}" type="datetimeFigureOut">
               <a:rPr lang="en-US" smtClean="0"/>
-              <a:t>10/23/2018</a:t>
+              <a:t>10/30/2018</a:t>
             </a:fld>
             <a:endParaRPr lang="en-US"/>
           </a:p>
@@ -1698,7 +1698,7 @@
           <a:p>
             <a:fld id="{78C97017-6FC3-485B-9764-EAC9E56C1D49}" type="datetimeFigureOut">
               <a:rPr lang="en-US" smtClean="0"/>
-              <a:t>10/23/2018</a:t>
+              <a:t>10/30/2018</a:t>
             </a:fld>
             <a:endParaRPr lang="en-US"/>
           </a:p>
@@ -2117,7 +2117,7 @@
           <a:p>
             <a:fld id="{78C97017-6FC3-485B-9764-EAC9E56C1D49}" type="datetimeFigureOut">
               <a:rPr lang="en-US" smtClean="0"/>
-              <a:t>10/23/2018</a:t>
+              <a:t>10/30/2018</a:t>
             </a:fld>
             <a:endParaRPr lang="en-US"/>
           </a:p>
@@ -2234,7 +2234,7 @@
           <a:p>
             <a:fld id="{78C97017-6FC3-485B-9764-EAC9E56C1D49}" type="datetimeFigureOut">
               <a:rPr lang="en-US" smtClean="0"/>
-              <a:t>10/23/2018</a:t>
+              <a:t>10/30/2018</a:t>
             </a:fld>
             <a:endParaRPr lang="en-US"/>
           </a:p>
@@ -2329,7 +2329,7 @@
           <a:p>
             <a:fld id="{78C97017-6FC3-485B-9764-EAC9E56C1D49}" type="datetimeFigureOut">
               <a:rPr lang="en-US" smtClean="0"/>
-              <a:t>10/23/2018</a:t>
+              <a:t>10/30/2018</a:t>
             </a:fld>
             <a:endParaRPr lang="en-US"/>
           </a:p>
@@ -2604,7 +2604,7 @@
           <a:p>
             <a:fld id="{78C97017-6FC3-485B-9764-EAC9E56C1D49}" type="datetimeFigureOut">
               <a:rPr lang="en-US" smtClean="0"/>
-              <a:t>10/23/2018</a:t>
+              <a:t>10/30/2018</a:t>
             </a:fld>
             <a:endParaRPr lang="en-US"/>
           </a:p>
@@ -2856,7 +2856,7 @@
           <a:p>
             <a:fld id="{78C97017-6FC3-485B-9764-EAC9E56C1D49}" type="datetimeFigureOut">
               <a:rPr lang="en-US" smtClean="0"/>
-              <a:t>10/23/2018</a:t>
+              <a:t>10/30/2018</a:t>
             </a:fld>
             <a:endParaRPr lang="en-US"/>
           </a:p>
@@ -3067,7 +3067,7 @@
           <a:p>
             <a:fld id="{78C97017-6FC3-485B-9764-EAC9E56C1D49}" type="datetimeFigureOut">
               <a:rPr lang="en-US" smtClean="0"/>
-              <a:t>10/23/2018</a:t>
+              <a:t>10/30/2018</a:t>
             </a:fld>
             <a:endParaRPr lang="en-US"/>
           </a:p>
@@ -4741,7 +4741,7 @@
         </p:nvSpPr>
         <p:spPr>
           <a:xfrm>
-            <a:off x="4043539" y="2113501"/>
+            <a:off x="3962400" y="1905000"/>
             <a:ext cx="1156969" cy="285783"/>
           </a:xfrm>
           <a:prstGeom prst="rect">
@@ -4807,8 +4807,8 @@
         </p:nvCxnSpPr>
         <p:spPr>
           <a:xfrm rot="5400000" flipH="1" flipV="1">
-            <a:off x="3520848" y="2442814"/>
-            <a:ext cx="709111" cy="336271"/>
+            <a:off x="3376028" y="2379132"/>
+            <a:ext cx="917612" cy="255132"/>
           </a:xfrm>
           <a:prstGeom prst="bentConnector2">
             <a:avLst/>
@@ -4848,17 +4848,20 @@
           </p:cNvPr>
           <p:cNvCxnSpPr>
             <a:cxnSpLocks/>
+            <a:stCxn id="71" idx="3"/>
             <a:endCxn id="67" idx="1"/>
           </p:cNvCxnSpPr>
           <p:nvPr/>
         </p:nvCxnSpPr>
         <p:spPr>
           <a:xfrm flipV="1">
-            <a:off x="5171947" y="2139646"/>
-            <a:ext cx="432916" cy="111294"/>
+            <a:off x="5335254" y="2036420"/>
+            <a:ext cx="269609" cy="1840"/>
           </a:xfrm>
           <a:prstGeom prst="bentConnector3">
-            <a:avLst/>
+            <a:avLst>
+              <a:gd name="adj1" fmla="val 50000"/>
+            </a:avLst>
           </a:prstGeom>
           <a:ln w="19050">
             <a:solidFill>
@@ -4898,7 +4901,7 @@
         </p:nvSpPr>
         <p:spPr>
           <a:xfrm>
-            <a:off x="5604863" y="1966266"/>
+            <a:off x="5604863" y="1863040"/>
             <a:ext cx="708186" cy="346760"/>
           </a:xfrm>
           <a:prstGeom prst="rect">
@@ -5050,7 +5053,7 @@
         </p:nvSpPr>
         <p:spPr>
           <a:xfrm>
-            <a:off x="5198996" y="2168721"/>
+            <a:off x="5099206" y="1951570"/>
             <a:ext cx="236048" cy="173380"/>
           </a:xfrm>
           <a:prstGeom prst="flowChartDecision">
@@ -5417,8 +5420,8 @@
         </p:nvSpPr>
         <p:spPr>
           <a:xfrm>
-            <a:off x="6984822" y="2465510"/>
-            <a:ext cx="708186" cy="285783"/>
+            <a:off x="6984822" y="2330853"/>
+            <a:ext cx="708186" cy="240930"/>
           </a:xfrm>
           <a:prstGeom prst="rect">
             <a:avLst/>
@@ -5536,8 +5539,8 @@
         </p:nvCxnSpPr>
         <p:spPr>
           <a:xfrm flipV="1">
-            <a:off x="6542503" y="2608402"/>
-            <a:ext cx="442319" cy="331476"/>
+            <a:off x="6542503" y="2451318"/>
+            <a:ext cx="442319" cy="488560"/>
           </a:xfrm>
           <a:prstGeom prst="bentConnector3">
             <a:avLst/>
@@ -5580,8 +5583,8 @@
         </p:nvSpPr>
         <p:spPr>
           <a:xfrm>
-            <a:off x="6984822" y="2788488"/>
-            <a:ext cx="708186" cy="285783"/>
+            <a:off x="6984822" y="2615386"/>
+            <a:ext cx="708186" cy="254803"/>
           </a:xfrm>
           <a:prstGeom prst="rect">
             <a:avLst/>
@@ -5638,6 +5641,7 @@
             </a:extLst>
           </p:cNvPr>
           <p:cNvCxnSpPr>
+            <a:cxnSpLocks/>
             <a:stCxn id="96" idx="3"/>
             <a:endCxn id="98" idx="1"/>
           </p:cNvCxnSpPr>
@@ -5645,8 +5649,8 @@
         </p:nvCxnSpPr>
         <p:spPr>
           <a:xfrm flipV="1">
-            <a:off x="6542503" y="2931380"/>
-            <a:ext cx="442319" cy="8498"/>
+            <a:off x="6542503" y="2742788"/>
+            <a:ext cx="442319" cy="197090"/>
           </a:xfrm>
           <a:prstGeom prst="bentConnector3">
             <a:avLst/>
@@ -5689,8 +5693,8 @@
         </p:nvSpPr>
         <p:spPr>
           <a:xfrm>
-            <a:off x="6984822" y="3111466"/>
-            <a:ext cx="708186" cy="285783"/>
+            <a:off x="6984822" y="2895600"/>
+            <a:ext cx="708186" cy="254803"/>
           </a:xfrm>
           <a:prstGeom prst="rect">
             <a:avLst/>
@@ -5747,6 +5751,7 @@
             </a:extLst>
           </p:cNvPr>
           <p:cNvCxnSpPr>
+            <a:cxnSpLocks/>
             <a:stCxn id="96" idx="3"/>
             <a:endCxn id="100" idx="1"/>
           </p:cNvCxnSpPr>
@@ -5755,7 +5760,7 @@
         <p:spPr>
           <a:xfrm>
             <a:off x="6542503" y="2939878"/>
-            <a:ext cx="442319" cy="314480"/>
+            <a:ext cx="442319" cy="83124"/>
           </a:xfrm>
           <a:prstGeom prst="bentConnector3">
             <a:avLst/>
@@ -5798,8 +5803,8 @@
         </p:nvSpPr>
         <p:spPr>
           <a:xfrm>
-            <a:off x="6984822" y="3434443"/>
-            <a:ext cx="708186" cy="285783"/>
+            <a:off x="6984822" y="3178433"/>
+            <a:ext cx="708186" cy="250567"/>
           </a:xfrm>
           <a:prstGeom prst="rect">
             <a:avLst/>
@@ -5856,6 +5861,7 @@
             </a:extLst>
           </p:cNvPr>
           <p:cNvCxnSpPr>
+            <a:cxnSpLocks/>
             <a:stCxn id="96" idx="3"/>
             <a:endCxn id="102" idx="1"/>
           </p:cNvCxnSpPr>
@@ -5864,7 +5870,7 @@
         <p:spPr>
           <a:xfrm>
             <a:off x="6542503" y="2939878"/>
-            <a:ext cx="442319" cy="637457"/>
+            <a:ext cx="442319" cy="363839"/>
           </a:xfrm>
           <a:prstGeom prst="bentConnector3">
             <a:avLst/>
@@ -5907,8 +5913,8 @@
         </p:nvSpPr>
         <p:spPr>
           <a:xfrm>
-            <a:off x="6981036" y="3757420"/>
-            <a:ext cx="708186" cy="285783"/>
+            <a:off x="6994195" y="3470320"/>
+            <a:ext cx="708186" cy="273969"/>
           </a:xfrm>
           <a:prstGeom prst="rect">
             <a:avLst/>
@@ -5935,19 +5941,19 @@
           </a:fontRef>
         </p:style>
         <p:txBody>
-          <a:bodyPr rtlCol="0" anchor="ctr"/>
+          <a:bodyPr lIns="0" rIns="0" rtlCol="0" anchor="ctr"/>
           <a:lstStyle/>
           <a:p>
             <a:pPr algn="ctr"/>
             <a:r>
-              <a:rPr lang="en-US" sz="700" dirty="0" err="1">
+              <a:rPr lang="en-US" sz="900" dirty="0" err="1">
                 <a:solidFill>
                   <a:srgbClr val="7030A0"/>
                 </a:solidFill>
               </a:rPr>
               <a:t>ProfilePicture</a:t>
             </a:r>
-            <a:endParaRPr lang="en-SG" sz="700" dirty="0">
+            <a:endParaRPr lang="en-SG" sz="900" dirty="0">
               <a:solidFill>
                 <a:srgbClr val="7030A0"/>
               </a:solidFill>
@@ -5974,7 +5980,7 @@
         <p:spPr>
           <a:xfrm>
             <a:off x="6542503" y="2939878"/>
-            <a:ext cx="438533" cy="960434"/>
+            <a:ext cx="451692" cy="667427"/>
           </a:xfrm>
           <a:prstGeom prst="bentConnector3">
             <a:avLst>
@@ -6019,7 +6025,7 @@
         </p:nvSpPr>
         <p:spPr>
           <a:xfrm>
-            <a:off x="6761769" y="4231787"/>
+            <a:off x="6821143" y="4267200"/>
             <a:ext cx="189257" cy="178683"/>
           </a:xfrm>
           <a:prstGeom prst="rect">
@@ -6043,68 +6049,6 @@
               <a:t>*</a:t>
             </a:r>
             <a:endParaRPr lang="en-SG" sz="1100" dirty="0">
-              <a:solidFill>
-                <a:srgbClr val="7030A0"/>
-              </a:solidFill>
-            </a:endParaRPr>
-          </a:p>
-        </p:txBody>
-      </p:sp>
-      <p:sp>
-        <p:nvSpPr>
-          <p:cNvPr id="108" name="Rectangle 8">
-            <a:extLst>
-              <a:ext uri="{FF2B5EF4-FFF2-40B4-BE49-F238E27FC236}">
-                <a16:creationId xmlns:a16="http://schemas.microsoft.com/office/drawing/2014/main" id="{A09BB0E0-3411-4B00-8067-0B6E8EA4C19B}"/>
-              </a:ext>
-            </a:extLst>
-          </p:cNvPr>
-          <p:cNvSpPr/>
-          <p:nvPr/>
-        </p:nvSpPr>
-        <p:spPr>
-          <a:xfrm>
-            <a:off x="6981036" y="4080397"/>
-            <a:ext cx="708186" cy="285783"/>
-          </a:xfrm>
-          <a:prstGeom prst="rect">
-            <a:avLst/>
-          </a:prstGeom>
-          <a:ln w="19050">
-            <a:solidFill>
-              <a:srgbClr val="7030A0"/>
-            </a:solidFill>
-          </a:ln>
-          <a:effectLst/>
-        </p:spPr>
-        <p:style>
-          <a:lnRef idx="1">
-            <a:schemeClr val="accent4"/>
-          </a:lnRef>
-          <a:fillRef idx="2">
-            <a:schemeClr val="accent4"/>
-          </a:fillRef>
-          <a:effectRef idx="1">
-            <a:schemeClr val="accent4"/>
-          </a:effectRef>
-          <a:fontRef idx="minor">
-            <a:schemeClr val="dk1"/>
-          </a:fontRef>
-        </p:style>
-        <p:txBody>
-          <a:bodyPr rtlCol="0" anchor="ctr"/>
-          <a:lstStyle/>
-          <a:p>
-            <a:pPr algn="ctr"/>
-            <a:r>
-              <a:rPr lang="en-US" sz="1050" dirty="0">
-                <a:solidFill>
-                  <a:srgbClr val="7030A0"/>
-                </a:solidFill>
-              </a:rPr>
-              <a:t>Tag</a:t>
-            </a:r>
-            <a:endParaRPr lang="en-SG" sz="1050" dirty="0">
               <a:solidFill>
                 <a:srgbClr val="7030A0"/>
               </a:solidFill>
@@ -6124,14 +6068,14 @@
           <p:cNvCxnSpPr>
             <a:cxnSpLocks/>
             <a:stCxn id="96" idx="3"/>
-            <a:endCxn id="108" idx="1"/>
+            <a:endCxn id="74" idx="1"/>
           </p:cNvCxnSpPr>
           <p:nvPr/>
         </p:nvCxnSpPr>
         <p:spPr>
           <a:xfrm>
             <a:off x="6542503" y="2939878"/>
-            <a:ext cx="438533" cy="1283411"/>
+            <a:ext cx="451504" cy="1273090"/>
           </a:xfrm>
           <a:prstGeom prst="bentConnector3">
             <a:avLst>
@@ -6176,7 +6120,7 @@
         </p:nvSpPr>
         <p:spPr>
           <a:xfrm>
-            <a:off x="6981036" y="4408581"/>
+            <a:off x="6992441" y="4420692"/>
             <a:ext cx="708186" cy="285783"/>
           </a:xfrm>
           <a:prstGeom prst="rect">
@@ -6243,7 +6187,7 @@
         <p:spPr>
           <a:xfrm>
             <a:off x="6542503" y="2939878"/>
-            <a:ext cx="438533" cy="1611595"/>
+            <a:ext cx="449938" cy="1623706"/>
           </a:xfrm>
           <a:prstGeom prst="bentConnector3">
             <a:avLst>
@@ -6288,7 +6232,7 @@
         </p:nvSpPr>
         <p:spPr>
           <a:xfrm>
-            <a:off x="6990409" y="719522"/>
+            <a:off x="6990409" y="609600"/>
             <a:ext cx="708186" cy="285783"/>
           </a:xfrm>
           <a:prstGeom prst="rect">
@@ -6350,7 +6294,7 @@
         </p:nvSpPr>
         <p:spPr>
           <a:xfrm>
-            <a:off x="6327778" y="2068302"/>
+            <a:off x="6327778" y="1950142"/>
             <a:ext cx="236048" cy="173380"/>
           </a:xfrm>
           <a:prstGeom prst="flowChartDecision">
@@ -6407,8 +6351,8 @@
         </p:nvCxnSpPr>
         <p:spPr>
           <a:xfrm flipV="1">
-            <a:off x="6563826" y="862414"/>
-            <a:ext cx="426583" cy="1292578"/>
+            <a:off x="6563826" y="752492"/>
+            <a:ext cx="426583" cy="1284340"/>
           </a:xfrm>
           <a:prstGeom prst="bentConnector3">
             <a:avLst/>
@@ -6451,7 +6395,7 @@
         </p:nvSpPr>
         <p:spPr>
           <a:xfrm>
-            <a:off x="6990409" y="1042500"/>
+            <a:off x="6990409" y="932578"/>
             <a:ext cx="708186" cy="285783"/>
           </a:xfrm>
           <a:prstGeom prst="rect">
@@ -6516,8 +6460,8 @@
         </p:nvCxnSpPr>
         <p:spPr>
           <a:xfrm flipV="1">
-            <a:off x="6563826" y="1185392"/>
-            <a:ext cx="426583" cy="969600"/>
+            <a:off x="6563826" y="1075470"/>
+            <a:ext cx="426583" cy="961362"/>
           </a:xfrm>
           <a:prstGeom prst="bentConnector3">
             <a:avLst/>
@@ -6560,7 +6504,7 @@
         </p:nvSpPr>
         <p:spPr>
           <a:xfrm>
-            <a:off x="6990409" y="1365478"/>
+            <a:off x="6990409" y="1255556"/>
             <a:ext cx="708186" cy="285783"/>
           </a:xfrm>
           <a:prstGeom prst="rect">
@@ -6625,8 +6569,8 @@
         </p:nvCxnSpPr>
         <p:spPr>
           <a:xfrm flipV="1">
-            <a:off x="6563826" y="1508370"/>
-            <a:ext cx="426583" cy="646622"/>
+            <a:off x="6563826" y="1398448"/>
+            <a:ext cx="426583" cy="638384"/>
           </a:xfrm>
           <a:prstGeom prst="bentConnector3">
             <a:avLst/>
@@ -6669,7 +6613,7 @@
         </p:nvSpPr>
         <p:spPr>
           <a:xfrm>
-            <a:off x="6990409" y="1688455"/>
+            <a:off x="6990409" y="1578533"/>
             <a:ext cx="708186" cy="285783"/>
           </a:xfrm>
           <a:prstGeom prst="rect">
@@ -6734,8 +6678,8 @@
         </p:nvCxnSpPr>
         <p:spPr>
           <a:xfrm flipV="1">
-            <a:off x="6563826" y="1831347"/>
-            <a:ext cx="426583" cy="323645"/>
+            <a:off x="6563826" y="1721425"/>
+            <a:ext cx="426583" cy="315407"/>
           </a:xfrm>
           <a:prstGeom prst="bentConnector3">
             <a:avLst/>
@@ -6778,7 +6722,7 @@
         </p:nvSpPr>
         <p:spPr>
           <a:xfrm>
-            <a:off x="6990409" y="2012101"/>
+            <a:off x="6990409" y="1902179"/>
             <a:ext cx="708186" cy="285783"/>
           </a:xfrm>
           <a:prstGeom prst="rect">
@@ -6844,8 +6788,8 @@
         </p:nvCxnSpPr>
         <p:spPr>
           <a:xfrm>
-            <a:off x="6563826" y="2154992"/>
-            <a:ext cx="426583" cy="1"/>
+            <a:off x="6563826" y="2036832"/>
+            <a:ext cx="426583" cy="8239"/>
           </a:xfrm>
           <a:prstGeom prst="bentConnector3">
             <a:avLst>
@@ -6893,13 +6837,13 @@
           <p:nvPr/>
         </p:nvCxnSpPr>
         <p:spPr>
-          <a:xfrm flipV="1">
-            <a:off x="7689222" y="2154993"/>
-            <a:ext cx="9373" cy="2396480"/>
+          <a:xfrm flipH="1" flipV="1">
+            <a:off x="7698595" y="2045071"/>
+            <a:ext cx="2032" cy="2518513"/>
           </a:xfrm>
           <a:prstGeom prst="bentConnector3">
             <a:avLst>
-              <a:gd name="adj1" fmla="val 2538920"/>
+              <a:gd name="adj1" fmla="val -9222982"/>
             </a:avLst>
           </a:prstGeom>
           <a:ln w="19050">
@@ -6940,7 +6884,7 @@
         </p:nvSpPr>
         <p:spPr>
           <a:xfrm>
-            <a:off x="8058291" y="4408580"/>
+            <a:off x="8077200" y="4408580"/>
             <a:ext cx="708186" cy="285783"/>
           </a:xfrm>
           <a:prstGeom prst="rect">
@@ -6988,56 +6932,6 @@
           </a:p>
         </p:txBody>
       </p:sp>
-      <p:cxnSp>
-        <p:nvCxnSpPr>
-          <p:cNvPr id="149" name="Elbow Connector 85">
-            <a:extLst>
-              <a:ext uri="{FF2B5EF4-FFF2-40B4-BE49-F238E27FC236}">
-                <a16:creationId xmlns:a16="http://schemas.microsoft.com/office/drawing/2014/main" id="{6BCC4F5D-C168-4010-8DC8-9B1F98AE6D1B}"/>
-              </a:ext>
-            </a:extLst>
-          </p:cNvPr>
-          <p:cNvCxnSpPr>
-            <a:cxnSpLocks/>
-            <a:stCxn id="110" idx="3"/>
-            <a:endCxn id="148" idx="1"/>
-          </p:cNvCxnSpPr>
-          <p:nvPr/>
-        </p:nvCxnSpPr>
-        <p:spPr>
-          <a:xfrm flipV="1">
-            <a:off x="7689222" y="4551472"/>
-            <a:ext cx="369069" cy="1"/>
-          </a:xfrm>
-          <a:prstGeom prst="bentConnector3">
-            <a:avLst>
-              <a:gd name="adj1" fmla="val 50000"/>
-            </a:avLst>
-          </a:prstGeom>
-          <a:ln w="19050">
-            <a:solidFill>
-              <a:srgbClr val="7030A0"/>
-            </a:solidFill>
-            <a:headEnd type="none" w="med" len="med"/>
-            <a:tailEnd type="arrow" w="med" len="med"/>
-          </a:ln>
-          <a:effectLst/>
-        </p:spPr>
-        <p:style>
-          <a:lnRef idx="1">
-            <a:schemeClr val="accent2"/>
-          </a:lnRef>
-          <a:fillRef idx="2">
-            <a:schemeClr val="accent2"/>
-          </a:fillRef>
-          <a:effectRef idx="1">
-            <a:schemeClr val="accent2"/>
-          </a:effectRef>
-          <a:fontRef idx="minor">
-            <a:schemeClr val="dk1"/>
-          </a:fontRef>
-        </p:style>
-      </p:cxnSp>
       <p:sp>
         <p:nvSpPr>
           <p:cNvPr id="152" name="TextBox 151">
@@ -7128,6 +7022,235 @@
           </a:p>
         </p:txBody>
       </p:sp>
+      <p:sp>
+        <p:nvSpPr>
+          <p:cNvPr id="74" name="Rectangle 8">
+            <a:extLst>
+              <a:ext uri="{FF2B5EF4-FFF2-40B4-BE49-F238E27FC236}">
+                <a16:creationId xmlns:a16="http://schemas.microsoft.com/office/drawing/2014/main" id="{F8BC612D-C501-4765-BFD5-BBAE409253E8}"/>
+              </a:ext>
+            </a:extLst>
+          </p:cNvPr>
+          <p:cNvSpPr/>
+          <p:nvPr/>
+        </p:nvSpPr>
+        <p:spPr>
+          <a:xfrm>
+            <a:off x="6994007" y="4056446"/>
+            <a:ext cx="708186" cy="313044"/>
+          </a:xfrm>
+          <a:prstGeom prst="rect">
+            <a:avLst/>
+          </a:prstGeom>
+          <a:ln w="19050">
+            <a:solidFill>
+              <a:srgbClr val="7030A0"/>
+            </a:solidFill>
+          </a:ln>
+          <a:effectLst/>
+        </p:spPr>
+        <p:style>
+          <a:lnRef idx="1">
+            <a:schemeClr val="accent4"/>
+          </a:lnRef>
+          <a:fillRef idx="2">
+            <a:schemeClr val="accent4"/>
+          </a:fillRef>
+          <a:effectRef idx="1">
+            <a:schemeClr val="accent4"/>
+          </a:effectRef>
+          <a:fontRef idx="minor">
+            <a:schemeClr val="dk1"/>
+          </a:fontRef>
+        </p:style>
+        <p:txBody>
+          <a:bodyPr rtlCol="0" anchor="ctr"/>
+          <a:lstStyle/>
+          <a:p>
+            <a:pPr algn="ctr"/>
+            <a:r>
+              <a:rPr lang="en-US" sz="800" dirty="0">
+                <a:solidFill>
+                  <a:srgbClr val="7030A0"/>
+                </a:solidFill>
+              </a:rPr>
+              <a:t>&lt;&lt;Set&gt;&gt; </a:t>
+            </a:r>
+          </a:p>
+          <a:p>
+            <a:pPr algn="ctr"/>
+            <a:r>
+              <a:rPr lang="en-US" sz="800" dirty="0">
+                <a:solidFill>
+                  <a:srgbClr val="7030A0"/>
+                </a:solidFill>
+              </a:rPr>
+              <a:t>Tag</a:t>
+            </a:r>
+            <a:endParaRPr lang="en-SG" sz="800" dirty="0">
+              <a:solidFill>
+                <a:srgbClr val="7030A0"/>
+              </a:solidFill>
+            </a:endParaRPr>
+          </a:p>
+        </p:txBody>
+      </p:sp>
+      <p:sp>
+        <p:nvSpPr>
+          <p:cNvPr id="112" name="Rectangle 8">
+            <a:extLst>
+              <a:ext uri="{FF2B5EF4-FFF2-40B4-BE49-F238E27FC236}">
+                <a16:creationId xmlns:a16="http://schemas.microsoft.com/office/drawing/2014/main" id="{EC735733-BBC2-48E9-BF55-8DE0F5009D3B}"/>
+              </a:ext>
+            </a:extLst>
+          </p:cNvPr>
+          <p:cNvSpPr/>
+          <p:nvPr/>
+        </p:nvSpPr>
+        <p:spPr>
+          <a:xfrm>
+            <a:off x="6990409" y="3790013"/>
+            <a:ext cx="708186" cy="227343"/>
+          </a:xfrm>
+          <a:prstGeom prst="rect">
+            <a:avLst/>
+          </a:prstGeom>
+          <a:ln w="19050">
+            <a:solidFill>
+              <a:srgbClr val="7030A0"/>
+            </a:solidFill>
+          </a:ln>
+          <a:effectLst/>
+        </p:spPr>
+        <p:style>
+          <a:lnRef idx="1">
+            <a:schemeClr val="accent4"/>
+          </a:lnRef>
+          <a:fillRef idx="2">
+            <a:schemeClr val="accent4"/>
+          </a:fillRef>
+          <a:effectRef idx="1">
+            <a:schemeClr val="accent4"/>
+          </a:effectRef>
+          <a:fontRef idx="minor">
+            <a:schemeClr val="dk1"/>
+          </a:fontRef>
+        </p:style>
+        <p:txBody>
+          <a:bodyPr rtlCol="0" anchor="ctr"/>
+          <a:lstStyle/>
+          <a:p>
+            <a:pPr algn="ctr"/>
+            <a:r>
+              <a:rPr lang="en-US" sz="1050" dirty="0">
+                <a:solidFill>
+                  <a:srgbClr val="7030A0"/>
+                </a:solidFill>
+              </a:rPr>
+              <a:t>Note</a:t>
+            </a:r>
+            <a:endParaRPr lang="en-SG" sz="1050" dirty="0">
+              <a:solidFill>
+                <a:srgbClr val="7030A0"/>
+              </a:solidFill>
+            </a:endParaRPr>
+          </a:p>
+        </p:txBody>
+      </p:sp>
+      <p:cxnSp>
+        <p:nvCxnSpPr>
+          <p:cNvPr id="113" name="Elbow Connector 85">
+            <a:extLst>
+              <a:ext uri="{FF2B5EF4-FFF2-40B4-BE49-F238E27FC236}">
+                <a16:creationId xmlns:a16="http://schemas.microsoft.com/office/drawing/2014/main" id="{6A188D13-5842-417B-B8CF-8655B67823D6}"/>
+              </a:ext>
+            </a:extLst>
+          </p:cNvPr>
+          <p:cNvCxnSpPr>
+            <a:cxnSpLocks/>
+            <a:stCxn id="96" idx="3"/>
+            <a:endCxn id="112" idx="1"/>
+          </p:cNvCxnSpPr>
+          <p:nvPr/>
+        </p:nvCxnSpPr>
+        <p:spPr>
+          <a:xfrm>
+            <a:off x="6542503" y="2939878"/>
+            <a:ext cx="447906" cy="963807"/>
+          </a:xfrm>
+          <a:prstGeom prst="bentConnector3">
+            <a:avLst>
+              <a:gd name="adj1" fmla="val 51839"/>
+            </a:avLst>
+          </a:prstGeom>
+          <a:ln w="19050">
+            <a:solidFill>
+              <a:srgbClr val="7030A0"/>
+            </a:solidFill>
+            <a:headEnd type="none" w="med" len="med"/>
+            <a:tailEnd type="arrow" w="med" len="med"/>
+          </a:ln>
+          <a:effectLst/>
+        </p:spPr>
+        <p:style>
+          <a:lnRef idx="1">
+            <a:schemeClr val="accent2"/>
+          </a:lnRef>
+          <a:fillRef idx="2">
+            <a:schemeClr val="accent2"/>
+          </a:fillRef>
+          <a:effectRef idx="1">
+            <a:schemeClr val="accent2"/>
+          </a:effectRef>
+          <a:fontRef idx="minor">
+            <a:schemeClr val="dk1"/>
+          </a:fontRef>
+        </p:style>
+      </p:cxnSp>
+      <p:cxnSp>
+        <p:nvCxnSpPr>
+          <p:cNvPr id="78" name="Straight Arrow Connector 77">
+            <a:extLst>
+              <a:ext uri="{FF2B5EF4-FFF2-40B4-BE49-F238E27FC236}">
+                <a16:creationId xmlns:a16="http://schemas.microsoft.com/office/drawing/2014/main" id="{59E25A25-6135-4A91-8763-08321A35E4C1}"/>
+              </a:ext>
+            </a:extLst>
+          </p:cNvPr>
+          <p:cNvCxnSpPr>
+            <a:stCxn id="110" idx="3"/>
+          </p:cNvCxnSpPr>
+          <p:nvPr/>
+        </p:nvCxnSpPr>
+        <p:spPr>
+          <a:xfrm flipV="1">
+            <a:off x="7700627" y="4551471"/>
+            <a:ext cx="376573" cy="12113"/>
+          </a:xfrm>
+          <a:prstGeom prst="straightConnector1">
+            <a:avLst/>
+          </a:prstGeom>
+          <a:ln w="19050">
+            <a:solidFill>
+              <a:schemeClr val="accent4"/>
+            </a:solidFill>
+            <a:tailEnd type="arrow"/>
+          </a:ln>
+        </p:spPr>
+        <p:style>
+          <a:lnRef idx="1">
+            <a:schemeClr val="accent1"/>
+          </a:lnRef>
+          <a:fillRef idx="0">
+            <a:schemeClr val="accent1"/>
+          </a:fillRef>
+          <a:effectRef idx="0">
+            <a:schemeClr val="accent1"/>
+          </a:effectRef>
+          <a:fontRef idx="minor">
+            <a:schemeClr val="tx1"/>
+          </a:fontRef>
+        </p:style>
+      </p:cxnSp>
     </p:spTree>
     <p:extLst>
       <p:ext uri="{BB962C8B-B14F-4D97-AF65-F5344CB8AC3E}">

</xml_diff>